<commit_message>
Update dev guide until 4.2
</commit_message>
<xml_diff>
--- a/docs/diagrams/ModelComponentClassDiagram.pptx
+++ b/docs/diagrams/ModelComponentClassDiagram.pptx
@@ -107,6 +107,22 @@
       </a:defRPr>
     </a:lvl9pPr>
   </p:defaultTextStyle>
+  <p:extLst>
+    <p:ext uri="{EFAFB233-063F-42B5-8137-9DF3F51BA10A}">
+      <p15:sldGuideLst xmlns:p15="http://schemas.microsoft.com/office/powerpoint/2012/main">
+        <p15:guide id="1" orient="horz" pos="1488">
+          <p15:clr>
+            <a:srgbClr val="A4A3A4"/>
+          </p15:clr>
+        </p15:guide>
+        <p15:guide id="2" pos="2880">
+          <p15:clr>
+            <a:srgbClr val="A4A3A4"/>
+          </p15:clr>
+        </p15:guide>
+      </p15:sldGuideLst>
+    </p:ext>
+  </p:extLst>
 </p:presentation>
 </file>
 
@@ -192,7 +208,7 @@
           <a:p>
             <a:fld id="{F5CC4B3F-88C1-4FFA-B1B6-F41C21DC6924}" type="datetimeFigureOut">
               <a:rPr lang="en-US" smtClean="0"/>
-              <a:t>11/19/2016</a:t>
+              <a:t>3/19/17</a:t>
             </a:fld>
             <a:endParaRPr lang="en-US"/>
           </a:p>
@@ -641,7 +657,7 @@
           <a:p>
             <a:fld id="{78C97017-6FC3-485B-9764-EAC9E56C1D49}" type="datetimeFigureOut">
               <a:rPr lang="en-US" smtClean="0"/>
-              <a:t>11/19/2016</a:t>
+              <a:t>3/19/17</a:t>
             </a:fld>
             <a:endParaRPr lang="en-US"/>
           </a:p>
@@ -811,7 +827,7 @@
           <a:p>
             <a:fld id="{78C97017-6FC3-485B-9764-EAC9E56C1D49}" type="datetimeFigureOut">
               <a:rPr lang="en-US" smtClean="0"/>
-              <a:t>11/19/2016</a:t>
+              <a:t>3/19/17</a:t>
             </a:fld>
             <a:endParaRPr lang="en-US"/>
           </a:p>
@@ -991,7 +1007,7 @@
           <a:p>
             <a:fld id="{78C97017-6FC3-485B-9764-EAC9E56C1D49}" type="datetimeFigureOut">
               <a:rPr lang="en-US" smtClean="0"/>
-              <a:t>11/19/2016</a:t>
+              <a:t>3/19/17</a:t>
             </a:fld>
             <a:endParaRPr lang="en-US"/>
           </a:p>
@@ -1161,7 +1177,7 @@
           <a:p>
             <a:fld id="{78C97017-6FC3-485B-9764-EAC9E56C1D49}" type="datetimeFigureOut">
               <a:rPr lang="en-US" smtClean="0"/>
-              <a:t>11/19/2016</a:t>
+              <a:t>3/19/17</a:t>
             </a:fld>
             <a:endParaRPr lang="en-US"/>
           </a:p>
@@ -1407,7 +1423,7 @@
           <a:p>
             <a:fld id="{78C97017-6FC3-485B-9764-EAC9E56C1D49}" type="datetimeFigureOut">
               <a:rPr lang="en-US" smtClean="0"/>
-              <a:t>11/19/2016</a:t>
+              <a:t>3/19/17</a:t>
             </a:fld>
             <a:endParaRPr lang="en-US"/>
           </a:p>
@@ -1695,7 +1711,7 @@
           <a:p>
             <a:fld id="{78C97017-6FC3-485B-9764-EAC9E56C1D49}" type="datetimeFigureOut">
               <a:rPr lang="en-US" smtClean="0"/>
-              <a:t>11/19/2016</a:t>
+              <a:t>3/19/17</a:t>
             </a:fld>
             <a:endParaRPr lang="en-US"/>
           </a:p>
@@ -2117,7 +2133,7 @@
           <a:p>
             <a:fld id="{78C97017-6FC3-485B-9764-EAC9E56C1D49}" type="datetimeFigureOut">
               <a:rPr lang="en-US" smtClean="0"/>
-              <a:t>11/19/2016</a:t>
+              <a:t>3/19/17</a:t>
             </a:fld>
             <a:endParaRPr lang="en-US"/>
           </a:p>
@@ -2235,7 +2251,7 @@
           <a:p>
             <a:fld id="{78C97017-6FC3-485B-9764-EAC9E56C1D49}" type="datetimeFigureOut">
               <a:rPr lang="en-US" smtClean="0"/>
-              <a:t>11/19/2016</a:t>
+              <a:t>3/19/17</a:t>
             </a:fld>
             <a:endParaRPr lang="en-US"/>
           </a:p>
@@ -2330,7 +2346,7 @@
           <a:p>
             <a:fld id="{78C97017-6FC3-485B-9764-EAC9E56C1D49}" type="datetimeFigureOut">
               <a:rPr lang="en-US" smtClean="0"/>
-              <a:t>11/19/2016</a:t>
+              <a:t>3/19/17</a:t>
             </a:fld>
             <a:endParaRPr lang="en-US"/>
           </a:p>
@@ -2607,7 +2623,7 @@
           <a:p>
             <a:fld id="{78C97017-6FC3-485B-9764-EAC9E56C1D49}" type="datetimeFigureOut">
               <a:rPr lang="en-US" smtClean="0"/>
-              <a:t>11/19/2016</a:t>
+              <a:t>3/19/17</a:t>
             </a:fld>
             <a:endParaRPr lang="en-US"/>
           </a:p>
@@ -2860,7 +2876,7 @@
           <a:p>
             <a:fld id="{78C97017-6FC3-485B-9764-EAC9E56C1D49}" type="datetimeFigureOut">
               <a:rPr lang="en-US" smtClean="0"/>
-              <a:t>11/19/2016</a:t>
+              <a:t>3/19/17</a:t>
             </a:fld>
             <a:endParaRPr lang="en-US"/>
           </a:p>
@@ -3073,7 +3089,7 @@
           <a:p>
             <a:fld id="{78C97017-6FC3-485B-9764-EAC9E56C1D49}" type="datetimeFigureOut">
               <a:rPr lang="en-US" smtClean="0"/>
-              <a:t>11/19/2016</a:t>
+              <a:t>3/19/17</a:t>
             </a:fld>
             <a:endParaRPr lang="en-US"/>
           </a:p>
@@ -3456,8 +3472,8 @@
         </p:nvSpPr>
         <p:spPr>
           <a:xfrm>
-            <a:off x="1119865" y="1727200"/>
-            <a:ext cx="7490735" cy="2997200"/>
+            <a:off x="618886" y="1631578"/>
+            <a:ext cx="8382000" cy="3352800"/>
           </a:xfrm>
           <a:prstGeom prst="roundRect">
             <a:avLst>
@@ -3517,7 +3533,7 @@
         </p:nvSpPr>
         <p:spPr>
           <a:xfrm>
-            <a:off x="2877180" y="3158440"/>
+            <a:off x="2647377" y="3139882"/>
             <a:ext cx="1093635" cy="346760"/>
           </a:xfrm>
           <a:prstGeom prst="rect">
@@ -3576,7 +3592,7 @@
         </p:nvSpPr>
         <p:spPr>
           <a:xfrm rot="16200000">
-            <a:off x="1683963" y="2868687"/>
+            <a:off x="1454160" y="2850129"/>
             <a:ext cx="1093635" cy="346760"/>
           </a:xfrm>
           <a:prstGeom prst="rect">
@@ -3637,7 +3653,7 @@
         </p:nvCxnSpPr>
         <p:spPr>
           <a:xfrm flipV="1">
-            <a:off x="6477000" y="3194131"/>
+            <a:off x="6247197" y="3175573"/>
             <a:ext cx="95385" cy="416514"/>
           </a:xfrm>
           <a:prstGeom prst="bentConnector2">
@@ -3678,7 +3694,7 @@
         </p:nvCxnSpPr>
         <p:spPr>
           <a:xfrm rot="5400000" flipH="1" flipV="1">
-            <a:off x="4360065" y="1080909"/>
+            <a:off x="4130262" y="1062351"/>
             <a:ext cx="378691" cy="4637261"/>
           </a:xfrm>
           <a:prstGeom prst="bentConnector4">
@@ -3720,7 +3736,7 @@
         </p:nvSpPr>
         <p:spPr>
           <a:xfrm rot="16200000">
-            <a:off x="956202" y="2861202"/>
+            <a:off x="726399" y="2842644"/>
             <a:ext cx="1093635" cy="346760"/>
           </a:xfrm>
           <a:prstGeom prst="rect">
@@ -3790,7 +3806,7 @@
         </p:nvSpPr>
         <p:spPr>
           <a:xfrm rot="16200000">
-            <a:off x="1626910" y="2952291"/>
+            <a:off x="1397107" y="2933733"/>
             <a:ext cx="270504" cy="175523"/>
           </a:xfrm>
           <a:prstGeom prst="triangle">
@@ -3840,7 +3856,7 @@
         </p:nvCxnSpPr>
         <p:spPr>
           <a:xfrm>
-            <a:off x="2656370" y="3326536"/>
+            <a:off x="2426567" y="3307978"/>
             <a:ext cx="220810" cy="5284"/>
           </a:xfrm>
           <a:prstGeom prst="straightConnector1">
@@ -3878,7 +3894,7 @@
         </p:nvSpPr>
         <p:spPr>
           <a:xfrm rot="5400000" flipV="1">
-            <a:off x="6253986" y="3522883"/>
+            <a:off x="6024183" y="3504325"/>
             <a:ext cx="270504" cy="175523"/>
           </a:xfrm>
           <a:prstGeom prst="triangle">
@@ -3929,7 +3945,7 @@
         </p:nvCxnSpPr>
         <p:spPr>
           <a:xfrm>
-            <a:off x="910091" y="3040053"/>
+            <a:off x="680288" y="3021495"/>
             <a:ext cx="419548" cy="2860"/>
           </a:xfrm>
           <a:prstGeom prst="bentConnector3">
@@ -3974,7 +3990,7 @@
         </p:nvCxnSpPr>
         <p:spPr>
           <a:xfrm flipV="1">
-            <a:off x="1849924" y="3040052"/>
+            <a:off x="1620121" y="3021494"/>
             <a:ext cx="216105" cy="1"/>
           </a:xfrm>
           <a:prstGeom prst="line">
@@ -4013,7 +4029,7 @@
         </p:nvSpPr>
         <p:spPr>
           <a:xfrm>
-            <a:off x="2420322" y="3239846"/>
+            <a:off x="2190519" y="3221288"/>
             <a:ext cx="236048" cy="173380"/>
           </a:xfrm>
           <a:prstGeom prst="flowChartDecision">
@@ -4058,7 +4074,7 @@
         </p:nvSpPr>
         <p:spPr>
           <a:xfrm>
-            <a:off x="2879490" y="2627420"/>
+            <a:off x="2649687" y="2608862"/>
             <a:ext cx="1093635" cy="346760"/>
           </a:xfrm>
           <a:prstGeom prst="rect">
@@ -4091,12 +4107,12 @@
           <a:p>
             <a:pPr algn="ctr"/>
             <a:r>
-              <a:rPr lang="en-US" sz="1050" dirty="0" err="1" smtClean="0">
+              <a:rPr lang="en-US" altLang="zh-CN" sz="1050" dirty="0" err="1" smtClean="0">
                 <a:solidFill>
                   <a:srgbClr val="7030A0"/>
                 </a:solidFill>
               </a:rPr>
-              <a:t>AddressBook</a:t>
+              <a:t>UTask</a:t>
             </a:r>
             <a:endParaRPr lang="en-SG" sz="1050" dirty="0">
               <a:solidFill>
@@ -4117,7 +4133,7 @@
         </p:nvCxnSpPr>
         <p:spPr>
           <a:xfrm>
-            <a:off x="2658680" y="2795516"/>
+            <a:off x="2428877" y="2776958"/>
             <a:ext cx="220810" cy="5284"/>
           </a:xfrm>
           <a:prstGeom prst="straightConnector1">
@@ -4155,7 +4171,7 @@
         </p:nvSpPr>
         <p:spPr>
           <a:xfrm>
-            <a:off x="2422632" y="2708826"/>
+            <a:off x="2192829" y="2690268"/>
             <a:ext cx="236048" cy="173380"/>
           </a:xfrm>
           <a:prstGeom prst="flowChartDecision">
@@ -4200,7 +4216,7 @@
         </p:nvSpPr>
         <p:spPr>
           <a:xfrm>
-            <a:off x="4487017" y="2847371"/>
+            <a:off x="4257214" y="2828813"/>
             <a:ext cx="1156969" cy="346760"/>
           </a:xfrm>
           <a:prstGeom prst="rect">
@@ -4238,7 +4254,23 @@
                   <a:srgbClr val="7030A0"/>
                 </a:solidFill>
               </a:rPr>
-              <a:t>UniquePersonList</a:t>
+              <a:t>Unique</a:t>
+            </a:r>
+            <a:r>
+              <a:rPr lang="en-US" altLang="zh-CN" sz="1050" dirty="0" err="1" smtClean="0">
+                <a:solidFill>
+                  <a:srgbClr val="7030A0"/>
+                </a:solidFill>
+              </a:rPr>
+              <a:t>Task</a:t>
+            </a:r>
+            <a:r>
+              <a:rPr lang="en-US" sz="1050" dirty="0" err="1" smtClean="0">
+                <a:solidFill>
+                  <a:srgbClr val="7030A0"/>
+                </a:solidFill>
+              </a:rPr>
+              <a:t>List</a:t>
             </a:r>
             <a:endParaRPr lang="en-SG" sz="1050" dirty="0">
               <a:solidFill>
@@ -4256,7 +4288,7 @@
         </p:nvSpPr>
         <p:spPr>
           <a:xfrm>
-            <a:off x="3984303" y="2673991"/>
+            <a:off x="3754500" y="2655433"/>
             <a:ext cx="236048" cy="173380"/>
           </a:xfrm>
           <a:prstGeom prst="flowChartDecision">
@@ -4306,7 +4338,7 @@
         </p:nvCxnSpPr>
         <p:spPr>
           <a:xfrm>
-            <a:off x="4220351" y="2760681"/>
+            <a:off x="3990548" y="2742123"/>
             <a:ext cx="266666" cy="260070"/>
           </a:xfrm>
           <a:prstGeom prst="bentConnector3">
@@ -4344,7 +4376,7 @@
         </p:nvSpPr>
         <p:spPr>
           <a:xfrm>
-            <a:off x="4477328" y="2280569"/>
+            <a:off x="4247525" y="2262011"/>
             <a:ext cx="1156969" cy="346760"/>
           </a:xfrm>
           <a:prstGeom prst="rect">
@@ -4403,7 +4435,7 @@
         </p:nvCxnSpPr>
         <p:spPr>
           <a:xfrm flipV="1">
-            <a:off x="4220351" y="2453949"/>
+            <a:off x="3990548" y="2435391"/>
             <a:ext cx="256977" cy="306732"/>
           </a:xfrm>
           <a:prstGeom prst="bentConnector3">
@@ -4443,7 +4475,7 @@
         </p:nvSpPr>
         <p:spPr>
           <a:xfrm>
-            <a:off x="6313677" y="2858066"/>
+            <a:off x="6438527" y="2848114"/>
             <a:ext cx="708186" cy="346760"/>
           </a:xfrm>
           <a:prstGeom prst="rect">
@@ -4476,12 +4508,12 @@
           <a:p>
             <a:pPr algn="ctr"/>
             <a:r>
-              <a:rPr lang="en-US" sz="1050" dirty="0" smtClean="0">
+              <a:rPr lang="en-US" altLang="zh-CN" sz="1050" dirty="0" smtClean="0">
                 <a:solidFill>
                   <a:srgbClr val="7030A0"/>
                 </a:solidFill>
               </a:rPr>
-              <a:t>Person</a:t>
+              <a:t>Task</a:t>
             </a:r>
             <a:endParaRPr lang="en-SG" sz="1050" dirty="0">
               <a:solidFill>
@@ -4499,7 +4531,7 @@
         </p:nvSpPr>
         <p:spPr>
           <a:xfrm>
-            <a:off x="5643227" y="2943979"/>
+            <a:off x="5413424" y="2925421"/>
             <a:ext cx="236048" cy="173380"/>
           </a:xfrm>
           <a:prstGeom prst="flowChartDecision">
@@ -4547,11 +4579,13 @@
         </p:nvCxnSpPr>
         <p:spPr>
           <a:xfrm>
-            <a:off x="5879275" y="3030669"/>
-            <a:ext cx="434402" cy="777"/>
+            <a:off x="5649472" y="3012111"/>
+            <a:ext cx="789055" cy="9383"/>
           </a:xfrm>
           <a:prstGeom prst="bentConnector3">
-            <a:avLst/>
+            <a:avLst>
+              <a:gd name="adj1" fmla="val 48391"/>
+            </a:avLst>
           </a:prstGeom>
           <a:ln w="19050">
             <a:solidFill>
@@ -4585,7 +4619,7 @@
         </p:nvSpPr>
         <p:spPr>
           <a:xfrm>
-            <a:off x="5336105" y="1809332"/>
+            <a:off x="5106302" y="1790774"/>
             <a:ext cx="483700" cy="346760"/>
           </a:xfrm>
           <a:prstGeom prst="rect">
@@ -4641,7 +4675,7 @@
         </p:nvSpPr>
         <p:spPr>
           <a:xfrm rot="16200000">
-            <a:off x="4921666" y="2066540"/>
+            <a:off x="4691863" y="2047982"/>
             <a:ext cx="236048" cy="173380"/>
           </a:xfrm>
           <a:prstGeom prst="flowChartDecision">
@@ -4689,7 +4723,7 @@
         </p:nvCxnSpPr>
         <p:spPr>
           <a:xfrm rot="5400000" flipH="1" flipV="1">
-            <a:off x="5161650" y="1860752"/>
+            <a:off x="4931847" y="1842194"/>
             <a:ext cx="52494" cy="296415"/>
           </a:xfrm>
           <a:prstGeom prst="bentConnector2">
@@ -4727,7 +4761,7 @@
         </p:nvSpPr>
         <p:spPr>
           <a:xfrm>
-            <a:off x="5128257" y="3429000"/>
+            <a:off x="4898454" y="3410442"/>
             <a:ext cx="1156969" cy="346760"/>
           </a:xfrm>
           <a:prstGeom prst="rect">
@@ -4780,7 +4814,15 @@
                   <a:srgbClr val="7030A0"/>
                 </a:solidFill>
               </a:rPr>
-              <a:t>ReadOnlyPerson</a:t>
+              <a:t>ReadOnly</a:t>
+            </a:r>
+            <a:r>
+              <a:rPr lang="en-US" altLang="zh-CN" sz="1050" dirty="0" err="1" smtClean="0">
+                <a:solidFill>
+                  <a:srgbClr val="7030A0"/>
+                </a:solidFill>
+              </a:rPr>
+              <a:t>Task</a:t>
             </a:r>
             <a:endParaRPr lang="en-SG" sz="1050" dirty="0">
               <a:solidFill>
@@ -4798,7 +4840,7 @@
         </p:nvSpPr>
         <p:spPr>
           <a:xfrm>
-            <a:off x="7712397" y="2564238"/>
+            <a:off x="7847528" y="2669839"/>
             <a:ext cx="708186" cy="285783"/>
           </a:xfrm>
           <a:prstGeom prst="rect">
@@ -4854,7 +4896,7 @@
         </p:nvSpPr>
         <p:spPr>
           <a:xfrm>
-            <a:off x="7041947" y="2948201"/>
+            <a:off x="7161888" y="2930891"/>
             <a:ext cx="236048" cy="173380"/>
           </a:xfrm>
           <a:prstGeom prst="flowChartDecision">
@@ -4904,8 +4946,8 @@
         </p:nvCxnSpPr>
         <p:spPr>
           <a:xfrm flipV="1">
-            <a:off x="7277995" y="2707130"/>
-            <a:ext cx="434402" cy="327761"/>
+            <a:off x="7397936" y="2812731"/>
+            <a:ext cx="449592" cy="204850"/>
           </a:xfrm>
           <a:prstGeom prst="bentConnector3">
             <a:avLst/>
@@ -4942,7 +4984,7 @@
         </p:nvSpPr>
         <p:spPr>
           <a:xfrm>
-            <a:off x="7712397" y="2887216"/>
+            <a:off x="7847528" y="2992817"/>
             <a:ext cx="708186" cy="285783"/>
           </a:xfrm>
           <a:prstGeom prst="rect">
@@ -4975,12 +5017,12 @@
           <a:p>
             <a:pPr algn="ctr"/>
             <a:r>
-              <a:rPr lang="en-US" sz="1050" dirty="0" smtClean="0">
+              <a:rPr lang="en-US" altLang="zh-CN" sz="1050" dirty="0" smtClean="0">
                 <a:solidFill>
                   <a:srgbClr val="7030A0"/>
                 </a:solidFill>
               </a:rPr>
-              <a:t>Phone</a:t>
+              <a:t>Deadline</a:t>
             </a:r>
             <a:endParaRPr lang="en-SG" sz="1050" dirty="0">
               <a:solidFill>
@@ -5000,12 +5042,14 @@
           <p:nvPr/>
         </p:nvCxnSpPr>
         <p:spPr>
-          <a:xfrm flipV="1">
-            <a:off x="7277995" y="3030108"/>
-            <a:ext cx="434402" cy="4783"/>
+          <a:xfrm>
+            <a:off x="7397936" y="3017581"/>
+            <a:ext cx="449592" cy="118128"/>
           </a:xfrm>
           <a:prstGeom prst="bentConnector3">
-            <a:avLst/>
+            <a:avLst>
+              <a:gd name="adj1" fmla="val 50000"/>
+            </a:avLst>
           </a:prstGeom>
           <a:ln w="19050">
             <a:solidFill>
@@ -5039,8 +5083,8 @@
         </p:nvSpPr>
         <p:spPr>
           <a:xfrm>
-            <a:off x="7712397" y="3210194"/>
-            <a:ext cx="708186" cy="285783"/>
+            <a:off x="7847527" y="3315796"/>
+            <a:ext cx="855459" cy="265198"/>
           </a:xfrm>
           <a:prstGeom prst="rect">
             <a:avLst/>
@@ -5072,12 +5116,12 @@
           <a:p>
             <a:pPr algn="ctr"/>
             <a:r>
-              <a:rPr lang="en-US" sz="1050" dirty="0" smtClean="0">
+              <a:rPr lang="en-US" altLang="zh-CN" sz="1050" smtClean="0">
                 <a:solidFill>
                   <a:srgbClr val="7030A0"/>
                 </a:solidFill>
               </a:rPr>
-              <a:t>Email</a:t>
+              <a:t>Timestamp</a:t>
             </a:r>
             <a:endParaRPr lang="en-SG" sz="1050" dirty="0">
               <a:solidFill>
@@ -5098,8 +5142,8 @@
         </p:nvCxnSpPr>
         <p:spPr>
           <a:xfrm>
-            <a:off x="7277995" y="3034891"/>
-            <a:ext cx="434402" cy="318195"/>
+            <a:off x="7397936" y="3017581"/>
+            <a:ext cx="449591" cy="430814"/>
           </a:xfrm>
           <a:prstGeom prst="bentConnector3">
             <a:avLst/>
@@ -5136,8 +5180,8 @@
         </p:nvSpPr>
         <p:spPr>
           <a:xfrm>
-            <a:off x="7712397" y="3533171"/>
-            <a:ext cx="708186" cy="285783"/>
+            <a:off x="7847527" y="3627560"/>
+            <a:ext cx="855458" cy="296780"/>
           </a:xfrm>
           <a:prstGeom prst="rect">
             <a:avLst/>
@@ -5169,12 +5213,12 @@
           <a:p>
             <a:pPr algn="ctr"/>
             <a:r>
-              <a:rPr lang="en-US" sz="1050" dirty="0" smtClean="0">
+              <a:rPr lang="en-US" altLang="zh-CN" sz="1050" dirty="0" smtClean="0">
                 <a:solidFill>
                   <a:srgbClr val="7030A0"/>
                 </a:solidFill>
               </a:rPr>
-              <a:t>Address</a:t>
+              <a:t>Frequency</a:t>
             </a:r>
             <a:endParaRPr lang="en-SG" sz="1050" dirty="0">
               <a:solidFill>
@@ -5188,18 +5232,20 @@
         <p:nvCxnSpPr>
           <p:cNvPr id="86" name="Elbow Connector 85"/>
           <p:cNvCxnSpPr>
-            <a:stCxn id="78" idx="3"/>
+            <a:stCxn id="62" idx="3"/>
             <a:endCxn id="85" idx="1"/>
           </p:cNvCxnSpPr>
           <p:nvPr/>
         </p:nvCxnSpPr>
         <p:spPr>
           <a:xfrm>
-            <a:off x="7277995" y="3034891"/>
-            <a:ext cx="434402" cy="641172"/>
+            <a:off x="7146713" y="3021494"/>
+            <a:ext cx="700814" cy="754456"/>
           </a:xfrm>
           <a:prstGeom prst="bentConnector3">
-            <a:avLst/>
+            <a:avLst>
+              <a:gd name="adj1" fmla="val 66310"/>
+            </a:avLst>
           </a:prstGeom>
           <a:ln w="19050">
             <a:solidFill>
@@ -5235,7 +5281,7 @@
         </p:nvCxnSpPr>
         <p:spPr>
           <a:xfrm rot="16200000" flipH="1">
-            <a:off x="3279321" y="2485431"/>
+            <a:off x="3049518" y="2466873"/>
             <a:ext cx="293825" cy="1"/>
           </a:xfrm>
           <a:prstGeom prst="bentConnector3">
@@ -5276,7 +5322,7 @@
         </p:nvSpPr>
         <p:spPr>
           <a:xfrm rot="10800000" flipV="1">
-            <a:off x="3290981" y="2162997"/>
+            <a:off x="3061178" y="2144439"/>
             <a:ext cx="270504" cy="175523"/>
           </a:xfrm>
           <a:prstGeom prst="triangle">
@@ -5324,7 +5370,7 @@
         </p:nvSpPr>
         <p:spPr>
           <a:xfrm>
-            <a:off x="2660303" y="1806470"/>
+            <a:off x="2450622" y="1802108"/>
             <a:ext cx="1539926" cy="346760"/>
           </a:xfrm>
           <a:prstGeom prst="rect">
@@ -5377,7 +5423,15 @@
                   <a:srgbClr val="7030A0"/>
                 </a:solidFill>
               </a:rPr>
-              <a:t>ReadOnlyAddressBook</a:t>
+              <a:t>ReadOnly</a:t>
+            </a:r>
+            <a:r>
+              <a:rPr lang="en-US" altLang="zh-CN" sz="1050" dirty="0" err="1" smtClean="0">
+                <a:solidFill>
+                  <a:srgbClr val="7030A0"/>
+                </a:solidFill>
+              </a:rPr>
+              <a:t>UTask</a:t>
             </a:r>
             <a:endParaRPr lang="en-SG" sz="1050" dirty="0">
               <a:solidFill>
@@ -5395,7 +5449,7 @@
         </p:nvSpPr>
         <p:spPr>
           <a:xfrm rot="16200000">
-            <a:off x="6527512" y="3586305"/>
+            <a:off x="6297709" y="3567747"/>
             <a:ext cx="881018" cy="261610"/>
           </a:xfrm>
           <a:prstGeom prst="rect">
@@ -5434,7 +5488,7 @@
         </p:nvSpPr>
         <p:spPr>
           <a:xfrm>
-            <a:off x="2057400" y="4239491"/>
+            <a:off x="1827597" y="4220933"/>
             <a:ext cx="1775949" cy="346760"/>
           </a:xfrm>
           <a:prstGeom prst="rect">
@@ -5516,7 +5570,7 @@
         </p:nvCxnSpPr>
         <p:spPr>
           <a:xfrm rot="16200000" flipH="1">
-            <a:off x="1364475" y="3719945"/>
+            <a:off x="1134672" y="3701387"/>
             <a:ext cx="831471" cy="554380"/>
           </a:xfrm>
           <a:prstGeom prst="bentConnector2">
@@ -5551,18 +5605,19 @@
         <p:nvCxnSpPr>
           <p:cNvPr id="50" name="Elbow Connector 49"/>
           <p:cNvCxnSpPr>
-            <a:stCxn id="62" idx="0"/>
             <a:endCxn id="57" idx="3"/>
           </p:cNvCxnSpPr>
           <p:nvPr/>
         </p:nvCxnSpPr>
         <p:spPr>
-          <a:xfrm rot="16200000" flipV="1">
-            <a:off x="5948976" y="2139271"/>
-            <a:ext cx="404117" cy="1033473"/>
-          </a:xfrm>
-          <a:prstGeom prst="bentConnector2">
-            <a:avLst/>
+          <a:xfrm rot="10800000">
+            <a:off x="5404495" y="2435392"/>
+            <a:ext cx="1006117" cy="457093"/>
+          </a:xfrm>
+          <a:prstGeom prst="bentConnector3">
+            <a:avLst>
+              <a:gd name="adj1" fmla="val 50000"/>
+            </a:avLst>
           </a:prstGeom>
           <a:ln w="19050">
             <a:solidFill>
@@ -5596,7 +5651,7 @@
         </p:nvSpPr>
         <p:spPr>
           <a:xfrm>
-            <a:off x="4324972" y="2191228"/>
+            <a:off x="4095169" y="2172670"/>
             <a:ext cx="189257" cy="178683"/>
           </a:xfrm>
           <a:prstGeom prst="rect">
@@ -5635,7 +5690,7 @@
         </p:nvSpPr>
         <p:spPr>
           <a:xfrm>
-            <a:off x="4324972" y="3058864"/>
+            <a:off x="4095169" y="3040306"/>
             <a:ext cx="189257" cy="178683"/>
           </a:xfrm>
           <a:prstGeom prst="rect">
@@ -5674,7 +5729,7 @@
         </p:nvSpPr>
         <p:spPr>
           <a:xfrm>
-            <a:off x="5689761" y="2495413"/>
+            <a:off x="5459958" y="2476855"/>
             <a:ext cx="189257" cy="178683"/>
           </a:xfrm>
           <a:prstGeom prst="rect">
@@ -5713,7 +5768,7 @@
         </p:nvSpPr>
         <p:spPr>
           <a:xfrm>
-            <a:off x="5163172" y="1778919"/>
+            <a:off x="4933369" y="1760361"/>
             <a:ext cx="189257" cy="178683"/>
           </a:xfrm>
           <a:prstGeom prst="rect">
@@ -5752,7 +5807,7 @@
         </p:nvSpPr>
         <p:spPr>
           <a:xfrm>
-            <a:off x="6135256" y="3097917"/>
+            <a:off x="5905453" y="3079359"/>
             <a:ext cx="189257" cy="178683"/>
           </a:xfrm>
           <a:prstGeom prst="rect">
@@ -5791,7 +5846,7 @@
         </p:nvSpPr>
         <p:spPr>
           <a:xfrm>
-            <a:off x="2687923" y="2564238"/>
+            <a:off x="2458120" y="2545680"/>
             <a:ext cx="189257" cy="178683"/>
           </a:xfrm>
           <a:prstGeom prst="rect">
@@ -5830,7 +5885,7 @@
         </p:nvSpPr>
         <p:spPr>
           <a:xfrm>
-            <a:off x="2656370" y="3386050"/>
+            <a:off x="2426567" y="3367492"/>
             <a:ext cx="189257" cy="178683"/>
           </a:xfrm>
           <a:prstGeom prst="rect">
@@ -5869,7 +5924,7 @@
         </p:nvSpPr>
         <p:spPr>
           <a:xfrm>
-            <a:off x="6667770" y="3210194"/>
+            <a:off x="6437967" y="3191636"/>
             <a:ext cx="189257" cy="178683"/>
           </a:xfrm>
           <a:prstGeom prst="rect">
@@ -5900,6 +5955,432 @@
           </a:p>
         </p:txBody>
       </p:sp>
+      <p:sp>
+        <p:nvSpPr>
+          <p:cNvPr id="93" name="Isosceles Triangle 102"/>
+          <p:cNvSpPr/>
+          <p:nvPr/>
+        </p:nvSpPr>
+        <p:spPr>
+          <a:xfrm rot="10800000">
+            <a:off x="6384574" y="2743833"/>
+            <a:ext cx="242650" cy="109184"/>
+          </a:xfrm>
+          <a:prstGeom prst="triangle">
+            <a:avLst/>
+          </a:prstGeom>
+          <a:ln w="19050">
+            <a:solidFill>
+              <a:srgbClr val="7030A0"/>
+            </a:solidFill>
+          </a:ln>
+          <a:effectLst/>
+        </p:spPr>
+        <p:style>
+          <a:lnRef idx="1">
+            <a:schemeClr val="accent4"/>
+          </a:lnRef>
+          <a:fillRef idx="2">
+            <a:schemeClr val="accent4"/>
+          </a:fillRef>
+          <a:effectRef idx="1">
+            <a:schemeClr val="accent4"/>
+          </a:effectRef>
+          <a:fontRef idx="minor">
+            <a:schemeClr val="dk1"/>
+          </a:fontRef>
+        </p:style>
+        <p:txBody>
+          <a:bodyPr rtlCol="0" anchor="ctr"/>
+          <a:lstStyle/>
+          <a:p>
+            <a:pPr algn="ctr"/>
+            <a:endParaRPr lang="en-SG" sz="1050" b="1">
+              <a:solidFill>
+                <a:srgbClr val="92D050"/>
+              </a:solidFill>
+            </a:endParaRPr>
+          </a:p>
+        </p:txBody>
+      </p:sp>
+      <p:sp>
+        <p:nvSpPr>
+          <p:cNvPr id="94" name="Isosceles Triangle 102"/>
+          <p:cNvSpPr/>
+          <p:nvPr/>
+        </p:nvSpPr>
+        <p:spPr>
+          <a:xfrm rot="10800000">
+            <a:off x="6911816" y="2742123"/>
+            <a:ext cx="242650" cy="109184"/>
+          </a:xfrm>
+          <a:prstGeom prst="triangle">
+            <a:avLst/>
+          </a:prstGeom>
+          <a:ln w="19050">
+            <a:solidFill>
+              <a:srgbClr val="7030A0"/>
+            </a:solidFill>
+          </a:ln>
+          <a:effectLst/>
+        </p:spPr>
+        <p:style>
+          <a:lnRef idx="1">
+            <a:schemeClr val="accent4"/>
+          </a:lnRef>
+          <a:fillRef idx="2">
+            <a:schemeClr val="accent4"/>
+          </a:fillRef>
+          <a:effectRef idx="1">
+            <a:schemeClr val="accent4"/>
+          </a:effectRef>
+          <a:fontRef idx="minor">
+            <a:schemeClr val="dk1"/>
+          </a:fontRef>
+        </p:style>
+        <p:txBody>
+          <a:bodyPr rtlCol="0" anchor="ctr"/>
+          <a:lstStyle/>
+          <a:p>
+            <a:pPr algn="ctr"/>
+            <a:endParaRPr lang="en-SG" sz="1050" b="1">
+              <a:solidFill>
+                <a:srgbClr val="92D050"/>
+              </a:solidFill>
+            </a:endParaRPr>
+          </a:p>
+        </p:txBody>
+      </p:sp>
+      <p:sp>
+        <p:nvSpPr>
+          <p:cNvPr id="95" name="Isosceles Triangle 102"/>
+          <p:cNvSpPr/>
+          <p:nvPr/>
+        </p:nvSpPr>
+        <p:spPr>
+          <a:xfrm rot="10800000">
+            <a:off x="6638238" y="2742123"/>
+            <a:ext cx="242650" cy="109184"/>
+          </a:xfrm>
+          <a:prstGeom prst="triangle">
+            <a:avLst/>
+          </a:prstGeom>
+          <a:ln w="19050">
+            <a:solidFill>
+              <a:srgbClr val="7030A0"/>
+            </a:solidFill>
+          </a:ln>
+          <a:effectLst/>
+        </p:spPr>
+        <p:style>
+          <a:lnRef idx="1">
+            <a:schemeClr val="accent4"/>
+          </a:lnRef>
+          <a:fillRef idx="2">
+            <a:schemeClr val="accent4"/>
+          </a:fillRef>
+          <a:effectRef idx="1">
+            <a:schemeClr val="accent4"/>
+          </a:effectRef>
+          <a:fontRef idx="minor">
+            <a:schemeClr val="dk1"/>
+          </a:fontRef>
+        </p:style>
+        <p:txBody>
+          <a:bodyPr rtlCol="0" anchor="ctr"/>
+          <a:lstStyle/>
+          <a:p>
+            <a:pPr algn="ctr"/>
+            <a:endParaRPr lang="en-SG" sz="1050" b="1">
+              <a:solidFill>
+                <a:srgbClr val="92D050"/>
+              </a:solidFill>
+            </a:endParaRPr>
+          </a:p>
+        </p:txBody>
+      </p:sp>
+      <p:sp>
+        <p:nvSpPr>
+          <p:cNvPr id="96" name="Rectangle 8"/>
+          <p:cNvSpPr/>
+          <p:nvPr/>
+        </p:nvSpPr>
+        <p:spPr>
+          <a:xfrm>
+            <a:off x="7730661" y="2062283"/>
+            <a:ext cx="941920" cy="230658"/>
+          </a:xfrm>
+          <a:prstGeom prst="rect">
+            <a:avLst/>
+          </a:prstGeom>
+          <a:ln w="19050">
+            <a:solidFill>
+              <a:srgbClr val="7030A0"/>
+            </a:solidFill>
+          </a:ln>
+          <a:effectLst/>
+        </p:spPr>
+        <p:style>
+          <a:lnRef idx="1">
+            <a:schemeClr val="accent4"/>
+          </a:lnRef>
+          <a:fillRef idx="2">
+            <a:schemeClr val="accent4"/>
+          </a:fillRef>
+          <a:effectRef idx="1">
+            <a:schemeClr val="accent4"/>
+          </a:effectRef>
+          <a:fontRef idx="minor">
+            <a:schemeClr val="dk1"/>
+          </a:fontRef>
+        </p:style>
+        <p:txBody>
+          <a:bodyPr rtlCol="0" anchor="ctr"/>
+          <a:lstStyle/>
+          <a:p>
+            <a:pPr algn="ctr"/>
+            <a:r>
+              <a:rPr lang="en-US" altLang="zh-CN" sz="1050" smtClean="0">
+                <a:solidFill>
+                  <a:srgbClr val="7030A0"/>
+                </a:solidFill>
+              </a:rPr>
+              <a:t>FloatingTask</a:t>
+            </a:r>
+            <a:endParaRPr lang="en-SG" sz="1050" dirty="0">
+              <a:solidFill>
+                <a:srgbClr val="7030A0"/>
+              </a:solidFill>
+            </a:endParaRPr>
+          </a:p>
+        </p:txBody>
+      </p:sp>
+      <p:sp>
+        <p:nvSpPr>
+          <p:cNvPr id="98" name="Rectangle 8"/>
+          <p:cNvSpPr/>
+          <p:nvPr/>
+        </p:nvSpPr>
+        <p:spPr>
+          <a:xfrm>
+            <a:off x="6861536" y="2065571"/>
+            <a:ext cx="778275" cy="235024"/>
+          </a:xfrm>
+          <a:prstGeom prst="rect">
+            <a:avLst/>
+          </a:prstGeom>
+          <a:ln w="19050">
+            <a:solidFill>
+              <a:srgbClr val="7030A0"/>
+            </a:solidFill>
+          </a:ln>
+          <a:effectLst/>
+        </p:spPr>
+        <p:style>
+          <a:lnRef idx="1">
+            <a:schemeClr val="accent4"/>
+          </a:lnRef>
+          <a:fillRef idx="2">
+            <a:schemeClr val="accent4"/>
+          </a:fillRef>
+          <a:effectRef idx="1">
+            <a:schemeClr val="accent4"/>
+          </a:effectRef>
+          <a:fontRef idx="minor">
+            <a:schemeClr val="dk1"/>
+          </a:fontRef>
+        </p:style>
+        <p:txBody>
+          <a:bodyPr rtlCol="0" anchor="ctr"/>
+          <a:lstStyle/>
+          <a:p>
+            <a:pPr algn="ctr"/>
+            <a:r>
+              <a:rPr lang="en-US" altLang="zh-CN" sz="1050" dirty="0" err="1" smtClean="0">
+                <a:solidFill>
+                  <a:srgbClr val="7030A0"/>
+                </a:solidFill>
+              </a:rPr>
+              <a:t>EventTask</a:t>
+            </a:r>
+            <a:endParaRPr lang="en-SG" sz="1050" dirty="0">
+              <a:solidFill>
+                <a:srgbClr val="7030A0"/>
+              </a:solidFill>
+            </a:endParaRPr>
+          </a:p>
+        </p:txBody>
+      </p:sp>
+      <p:sp>
+        <p:nvSpPr>
+          <p:cNvPr id="101" name="Rectangle 8"/>
+          <p:cNvSpPr/>
+          <p:nvPr/>
+        </p:nvSpPr>
+        <p:spPr>
+          <a:xfrm>
+            <a:off x="5740381" y="2062283"/>
+            <a:ext cx="1055627" cy="253033"/>
+          </a:xfrm>
+          <a:prstGeom prst="rect">
+            <a:avLst/>
+          </a:prstGeom>
+          <a:ln w="19050">
+            <a:solidFill>
+              <a:srgbClr val="7030A0"/>
+            </a:solidFill>
+          </a:ln>
+          <a:effectLst/>
+        </p:spPr>
+        <p:style>
+          <a:lnRef idx="1">
+            <a:schemeClr val="accent4"/>
+          </a:lnRef>
+          <a:fillRef idx="2">
+            <a:schemeClr val="accent4"/>
+          </a:fillRef>
+          <a:effectRef idx="1">
+            <a:schemeClr val="accent4"/>
+          </a:effectRef>
+          <a:fontRef idx="minor">
+            <a:schemeClr val="dk1"/>
+          </a:fontRef>
+        </p:style>
+        <p:txBody>
+          <a:bodyPr rtlCol="0" anchor="ctr"/>
+          <a:lstStyle/>
+          <a:p>
+            <a:pPr algn="ctr"/>
+            <a:r>
+              <a:rPr lang="en-US" altLang="zh-CN" sz="1050" dirty="0" err="1" smtClean="0">
+                <a:solidFill>
+                  <a:srgbClr val="7030A0"/>
+                </a:solidFill>
+              </a:rPr>
+              <a:t>DeadlineTask</a:t>
+            </a:r>
+            <a:endParaRPr lang="en-SG" sz="1050" dirty="0">
+              <a:solidFill>
+                <a:srgbClr val="7030A0"/>
+              </a:solidFill>
+            </a:endParaRPr>
+          </a:p>
+        </p:txBody>
+      </p:sp>
+      <p:cxnSp>
+        <p:nvCxnSpPr>
+          <p:cNvPr id="36" name="Straight Connector 35"/>
+          <p:cNvCxnSpPr>
+            <a:stCxn id="101" idx="2"/>
+            <a:endCxn id="93" idx="3"/>
+          </p:cNvCxnSpPr>
+          <p:nvPr/>
+        </p:nvCxnSpPr>
+        <p:spPr>
+          <a:xfrm>
+            <a:off x="6268195" y="2315316"/>
+            <a:ext cx="237704" cy="428517"/>
+          </a:xfrm>
+          <a:prstGeom prst="line">
+            <a:avLst/>
+          </a:prstGeom>
+          <a:ln>
+            <a:solidFill>
+              <a:schemeClr val="accent4"/>
+            </a:solidFill>
+          </a:ln>
+        </p:spPr>
+        <p:style>
+          <a:lnRef idx="2">
+            <a:schemeClr val="dk1"/>
+          </a:lnRef>
+          <a:fillRef idx="0">
+            <a:schemeClr val="dk1"/>
+          </a:fillRef>
+          <a:effectRef idx="1">
+            <a:schemeClr val="dk1"/>
+          </a:effectRef>
+          <a:fontRef idx="minor">
+            <a:schemeClr val="tx1"/>
+          </a:fontRef>
+        </p:style>
+      </p:cxnSp>
+      <p:cxnSp>
+        <p:nvCxnSpPr>
+          <p:cNvPr id="103" name="Straight Connector 102"/>
+          <p:cNvCxnSpPr>
+            <a:stCxn id="94" idx="3"/>
+            <a:endCxn id="96" idx="2"/>
+          </p:cNvCxnSpPr>
+          <p:nvPr/>
+        </p:nvCxnSpPr>
+        <p:spPr>
+          <a:xfrm flipV="1">
+            <a:off x="7033141" y="2292941"/>
+            <a:ext cx="1168480" cy="449182"/>
+          </a:xfrm>
+          <a:prstGeom prst="line">
+            <a:avLst/>
+          </a:prstGeom>
+          <a:ln>
+            <a:solidFill>
+              <a:schemeClr val="accent4"/>
+            </a:solidFill>
+          </a:ln>
+        </p:spPr>
+        <p:style>
+          <a:lnRef idx="2">
+            <a:schemeClr val="dk1"/>
+          </a:lnRef>
+          <a:fillRef idx="0">
+            <a:schemeClr val="dk1"/>
+          </a:fillRef>
+          <a:effectRef idx="1">
+            <a:schemeClr val="dk1"/>
+          </a:effectRef>
+          <a:fontRef idx="minor">
+            <a:schemeClr val="tx1"/>
+          </a:fontRef>
+        </p:style>
+      </p:cxnSp>
+      <p:cxnSp>
+        <p:nvCxnSpPr>
+          <p:cNvPr id="104" name="Straight Connector 103"/>
+          <p:cNvCxnSpPr>
+            <a:stCxn id="98" idx="2"/>
+            <a:endCxn id="95" idx="3"/>
+          </p:cNvCxnSpPr>
+          <p:nvPr/>
+        </p:nvCxnSpPr>
+        <p:spPr>
+          <a:xfrm flipH="1">
+            <a:off x="6759563" y="2300595"/>
+            <a:ext cx="491111" cy="441528"/>
+          </a:xfrm>
+          <a:prstGeom prst="line">
+            <a:avLst/>
+          </a:prstGeom>
+          <a:ln>
+            <a:solidFill>
+              <a:schemeClr val="accent4"/>
+            </a:solidFill>
+          </a:ln>
+        </p:spPr>
+        <p:style>
+          <a:lnRef idx="2">
+            <a:schemeClr val="dk1"/>
+          </a:lnRef>
+          <a:fillRef idx="0">
+            <a:schemeClr val="dk1"/>
+          </a:fillRef>
+          <a:effectRef idx="1">
+            <a:schemeClr val="dk1"/>
+          </a:effectRef>
+          <a:fontRef idx="minor">
+            <a:schemeClr val="tx1"/>
+          </a:fontRef>
+        </p:style>
+      </p:cxnSp>
     </p:spTree>
     <p:extLst>
       <p:ext uri="{BB962C8B-B14F-4D97-AF65-F5344CB8AC3E}">

</xml_diff>